<commit_message>
Fixed Randy's initial (J is extirpated) and removed multiplot option (no longer needed thanks to RJP's efforts).
</commit_message>
<xml_diff>
--- a/Traditional/core-cover.pptx
+++ b/Traditional/core-cover.pptx
@@ -288,7 +288,7 @@
           <a:p>
             <a:fld id="{D0D9D78C-757F-1042-9EB8-4511D9E92B90}" type="datetimeFigureOut">
               <a:rPr lang="en-US" smtClean="0"/>
-              <a:t>5/9/13</a:t>
+              <a:t>7/4/14</a:t>
             </a:fld>
             <a:endParaRPr lang="en-US"/>
           </a:p>
@@ -458,7 +458,7 @@
           <a:p>
             <a:fld id="{D0D9D78C-757F-1042-9EB8-4511D9E92B90}" type="datetimeFigureOut">
               <a:rPr lang="en-US" smtClean="0"/>
-              <a:t>5/9/13</a:t>
+              <a:t>7/4/14</a:t>
             </a:fld>
             <a:endParaRPr lang="en-US"/>
           </a:p>
@@ -638,7 +638,7 @@
           <a:p>
             <a:fld id="{D0D9D78C-757F-1042-9EB8-4511D9E92B90}" type="datetimeFigureOut">
               <a:rPr lang="en-US" smtClean="0"/>
-              <a:t>5/9/13</a:t>
+              <a:t>7/4/14</a:t>
             </a:fld>
             <a:endParaRPr lang="en-US"/>
           </a:p>
@@ -808,7 +808,7 @@
           <a:p>
             <a:fld id="{D0D9D78C-757F-1042-9EB8-4511D9E92B90}" type="datetimeFigureOut">
               <a:rPr lang="en-US" smtClean="0"/>
-              <a:t>5/9/13</a:t>
+              <a:t>7/4/14</a:t>
             </a:fld>
             <a:endParaRPr lang="en-US"/>
           </a:p>
@@ -1054,7 +1054,7 @@
           <a:p>
             <a:fld id="{D0D9D78C-757F-1042-9EB8-4511D9E92B90}" type="datetimeFigureOut">
               <a:rPr lang="en-US" smtClean="0"/>
-              <a:t>5/9/13</a:t>
+              <a:t>7/4/14</a:t>
             </a:fld>
             <a:endParaRPr lang="en-US"/>
           </a:p>
@@ -1342,7 +1342,7 @@
           <a:p>
             <a:fld id="{D0D9D78C-757F-1042-9EB8-4511D9E92B90}" type="datetimeFigureOut">
               <a:rPr lang="en-US" smtClean="0"/>
-              <a:t>5/9/13</a:t>
+              <a:t>7/4/14</a:t>
             </a:fld>
             <a:endParaRPr lang="en-US"/>
           </a:p>
@@ -1769,7 +1769,7 @@
           <a:p>
             <a:fld id="{D0D9D78C-757F-1042-9EB8-4511D9E92B90}" type="datetimeFigureOut">
               <a:rPr lang="en-US" smtClean="0"/>
-              <a:t>5/9/13</a:t>
+              <a:t>7/4/14</a:t>
             </a:fld>
             <a:endParaRPr lang="en-US"/>
           </a:p>
@@ -1887,7 +1887,7 @@
           <a:p>
             <a:fld id="{D0D9D78C-757F-1042-9EB8-4511D9E92B90}" type="datetimeFigureOut">
               <a:rPr lang="en-US" smtClean="0"/>
-              <a:t>5/9/13</a:t>
+              <a:t>7/4/14</a:t>
             </a:fld>
             <a:endParaRPr lang="en-US"/>
           </a:p>
@@ -1982,7 +1982,7 @@
           <a:p>
             <a:fld id="{D0D9D78C-757F-1042-9EB8-4511D9E92B90}" type="datetimeFigureOut">
               <a:rPr lang="en-US" smtClean="0"/>
-              <a:t>5/9/13</a:t>
+              <a:t>7/4/14</a:t>
             </a:fld>
             <a:endParaRPr lang="en-US"/>
           </a:p>
@@ -2259,7 +2259,7 @@
           <a:p>
             <a:fld id="{D0D9D78C-757F-1042-9EB8-4511D9E92B90}" type="datetimeFigureOut">
               <a:rPr lang="en-US" smtClean="0"/>
-              <a:t>5/9/13</a:t>
+              <a:t>7/4/14</a:t>
             </a:fld>
             <a:endParaRPr lang="en-US"/>
           </a:p>
@@ -2512,7 +2512,7 @@
           <a:p>
             <a:fld id="{D0D9D78C-757F-1042-9EB8-4511D9E92B90}" type="datetimeFigureOut">
               <a:rPr lang="en-US" smtClean="0"/>
-              <a:t>5/9/13</a:t>
+              <a:t>7/4/14</a:t>
             </a:fld>
             <a:endParaRPr lang="en-US"/>
           </a:p>
@@ -2725,7 +2725,7 @@
           <a:p>
             <a:fld id="{D0D9D78C-757F-1042-9EB8-4511D9E92B90}" type="datetimeFigureOut">
               <a:rPr lang="en-US" smtClean="0"/>
-              <a:t>5/9/13</a:t>
+              <a:t>7/4/14</a:t>
             </a:fld>
             <a:endParaRPr lang="en-US"/>
           </a:p>
@@ -3141,14 +3141,14 @@
           </a:p>
           <a:p>
             <a:r>
-              <a:rPr lang="en-US" sz="2000" dirty="0" smtClean="0">
+              <a:rPr lang="en-US" sz="2000" smtClean="0">
                 <a:latin typeface="Lucida Grande CY"/>
                 <a:cs typeface="Lucida Grande CY"/>
               </a:rPr>
-              <a:t>Randall J. </a:t>
-            </a:r>
-            <a:r>
-              <a:rPr lang="en-US" sz="2000" dirty="0" err="1" smtClean="0">
+              <a:t>Randall </a:t>
+            </a:r>
+            <a:r>
+              <a:rPr lang="en-US" sz="2000" smtClean="0">
                 <a:latin typeface="Lucida Grande CY"/>
                 <a:cs typeface="Lucida Grande CY"/>
               </a:rPr>
@@ -3175,10 +3175,6 @@
               </a:rPr>
               <a:t>A Compendium of Commands to Teach Statistics</a:t>
             </a:r>
-            <a:endParaRPr lang="en-US" sz="4400" dirty="0" smtClean="0">
-              <a:latin typeface="Lucida Grande CY"/>
-              <a:cs typeface="Lucida Grande CY"/>
-            </a:endParaRPr>
           </a:p>
           <a:p>
             <a:pPr algn="r"/>

</xml_diff>